<commit_message>
[UPDATE] slides session 20
</commit_message>
<xml_diff>
--- a/lectures/DL-Session20.pptx
+++ b/lectures/DL-Session20.pptx
@@ -116,8 +116,7 @@
 <file path=ppt/revisionInfo.xml><?xml version="1.0" encoding="utf-8"?>
 <p1510:revInfo xmlns:a="http://schemas.openxmlformats.org/drawingml/2006/main" xmlns:r="http://schemas.openxmlformats.org/officeDocument/2006/relationships" xmlns:p1510="http://schemas.microsoft.com/office/powerpoint/2015/10/main">
   <p1510:revLst>
-    <p1510:client id="{8D645D5B-2E87-2F00-FF12-7A07EC2D8463}" v="16" dt="2024-11-24T00:11:37.710"/>
-    <p1510:client id="{A16EF315-41C2-2A92-E48B-833DFBCDD336}" v="20" dt="2024-11-24T00:11:21.030"/>
+    <p1510:client id="{165801C5-0937-837D-38FF-50FB7447EB30}" v="72" dt="2024-11-28T20:31:18.273"/>
   </p1510:revLst>
 </p1510:revInfo>
 </file>
@@ -251,7 +250,7 @@
           <a:p>
             <a:fld id="{E431C0BB-DC71-4713-A787-95011EDB8CA8}" type="datetimeFigureOut">
               <a:rPr lang="pt-PT" smtClean="0"/>
-              <a:t>23/11/2024</a:t>
+              <a:t>28/11/2024</a:t>
             </a:fld>
             <a:endParaRPr lang="pt-PT"/>
           </a:p>
@@ -419,7 +418,7 @@
           <a:p>
             <a:fld id="{E431C0BB-DC71-4713-A787-95011EDB8CA8}" type="datetimeFigureOut">
               <a:rPr lang="pt-PT" smtClean="0"/>
-              <a:t>23/11/2024</a:t>
+              <a:t>28/11/2024</a:t>
             </a:fld>
             <a:endParaRPr lang="pt-PT"/>
           </a:p>
@@ -597,7 +596,7 @@
           <a:p>
             <a:fld id="{E431C0BB-DC71-4713-A787-95011EDB8CA8}" type="datetimeFigureOut">
               <a:rPr lang="pt-PT" smtClean="0"/>
-              <a:t>23/11/2024</a:t>
+              <a:t>28/11/2024</a:t>
             </a:fld>
             <a:endParaRPr lang="pt-PT"/>
           </a:p>
@@ -765,7 +764,7 @@
           <a:p>
             <a:fld id="{E431C0BB-DC71-4713-A787-95011EDB8CA8}" type="datetimeFigureOut">
               <a:rPr lang="pt-PT" smtClean="0"/>
-              <a:t>23/11/2024</a:t>
+              <a:t>28/11/2024</a:t>
             </a:fld>
             <a:endParaRPr lang="pt-PT"/>
           </a:p>
@@ -1010,7 +1009,7 @@
           <a:p>
             <a:fld id="{E431C0BB-DC71-4713-A787-95011EDB8CA8}" type="datetimeFigureOut">
               <a:rPr lang="pt-PT" smtClean="0"/>
-              <a:t>23/11/2024</a:t>
+              <a:t>28/11/2024</a:t>
             </a:fld>
             <a:endParaRPr lang="pt-PT"/>
           </a:p>
@@ -1239,7 +1238,7 @@
           <a:p>
             <a:fld id="{E431C0BB-DC71-4713-A787-95011EDB8CA8}" type="datetimeFigureOut">
               <a:rPr lang="pt-PT" smtClean="0"/>
-              <a:t>23/11/2024</a:t>
+              <a:t>28/11/2024</a:t>
             </a:fld>
             <a:endParaRPr lang="pt-PT"/>
           </a:p>
@@ -1603,7 +1602,7 @@
           <a:p>
             <a:fld id="{E431C0BB-DC71-4713-A787-95011EDB8CA8}" type="datetimeFigureOut">
               <a:rPr lang="pt-PT" smtClean="0"/>
-              <a:t>23/11/2024</a:t>
+              <a:t>28/11/2024</a:t>
             </a:fld>
             <a:endParaRPr lang="pt-PT"/>
           </a:p>
@@ -1720,7 +1719,7 @@
           <a:p>
             <a:fld id="{E431C0BB-DC71-4713-A787-95011EDB8CA8}" type="datetimeFigureOut">
               <a:rPr lang="pt-PT" smtClean="0"/>
-              <a:t>23/11/2024</a:t>
+              <a:t>28/11/2024</a:t>
             </a:fld>
             <a:endParaRPr lang="pt-PT"/>
           </a:p>
@@ -1815,7 +1814,7 @@
           <a:p>
             <a:fld id="{E431C0BB-DC71-4713-A787-95011EDB8CA8}" type="datetimeFigureOut">
               <a:rPr lang="pt-PT" smtClean="0"/>
-              <a:t>23/11/2024</a:t>
+              <a:t>28/11/2024</a:t>
             </a:fld>
             <a:endParaRPr lang="pt-PT"/>
           </a:p>
@@ -2090,7 +2089,7 @@
           <a:p>
             <a:fld id="{E431C0BB-DC71-4713-A787-95011EDB8CA8}" type="datetimeFigureOut">
               <a:rPr lang="pt-PT" smtClean="0"/>
-              <a:t>23/11/2024</a:t>
+              <a:t>28/11/2024</a:t>
             </a:fld>
             <a:endParaRPr lang="pt-PT"/>
           </a:p>
@@ -2342,7 +2341,7 @@
           <a:p>
             <a:fld id="{E431C0BB-DC71-4713-A787-95011EDB8CA8}" type="datetimeFigureOut">
               <a:rPr lang="pt-PT" smtClean="0"/>
-              <a:t>23/11/2024</a:t>
+              <a:t>28/11/2024</a:t>
             </a:fld>
             <a:endParaRPr lang="pt-PT"/>
           </a:p>
@@ -2553,7 +2552,7 @@
           <a:p>
             <a:fld id="{E431C0BB-DC71-4713-A787-95011EDB8CA8}" type="datetimeFigureOut">
               <a:rPr lang="pt-PT" smtClean="0"/>
-              <a:t>23/11/2024</a:t>
+              <a:t>28/11/2024</a:t>
             </a:fld>
             <a:endParaRPr lang="pt-PT"/>
           </a:p>
@@ -3807,8 +3806,8 @@
         </p:nvSpPr>
         <p:spPr>
           <a:xfrm>
-            <a:off x="2479200" y="3965796"/>
-            <a:ext cx="7242892" cy="1200329"/>
+            <a:off x="2479200" y="4242795"/>
+            <a:ext cx="7242892" cy="646331"/>
           </a:xfrm>
           <a:prstGeom prst="rect">
             <a:avLst/>
@@ -3826,68 +3825,20 @@
           <a:p>
             <a:pPr algn="ctr"/>
             <a:r>
+              <a:rPr lang="pt-PT" sz="3600" b="1" dirty="0">
+                <a:latin typeface="Calibri"/>
+                <a:ea typeface="Calibri"/>
+                <a:cs typeface="Calibri"/>
+              </a:rPr>
+              <a:t>Exam </a:t>
+            </a:r>
+            <a:r>
               <a:rPr lang="pt-PT" sz="3600" b="1" dirty="0" err="1">
                 <a:latin typeface="Calibri"/>
                 <a:ea typeface="Calibri"/>
                 <a:cs typeface="Calibri"/>
               </a:rPr>
-              <a:t>Attention</a:t>
-            </a:r>
-            <a:r>
-              <a:rPr lang="pt-PT" sz="3600" b="1" dirty="0">
-                <a:latin typeface="Calibri"/>
-                <a:ea typeface="Calibri"/>
-                <a:cs typeface="Calibri"/>
-              </a:rPr>
-              <a:t> </a:t>
-            </a:r>
-            <a:r>
-              <a:rPr lang="pt-PT" sz="3600" b="1" dirty="0" err="1">
-                <a:latin typeface="Calibri"/>
-                <a:ea typeface="Calibri"/>
-                <a:cs typeface="Calibri"/>
-              </a:rPr>
-              <a:t>Mechanisms</a:t>
-            </a:r>
-            <a:r>
-              <a:rPr lang="pt-PT" sz="3600" b="1" dirty="0">
-                <a:latin typeface="Calibri"/>
-                <a:ea typeface="Calibri"/>
-                <a:cs typeface="Calibri"/>
-              </a:rPr>
-              <a:t> – </a:t>
-            </a:r>
-            <a:r>
-              <a:rPr lang="pt-PT" sz="3600" b="1" dirty="0" err="1">
-                <a:latin typeface="Calibri"/>
-                <a:ea typeface="Calibri"/>
-                <a:cs typeface="Calibri"/>
-              </a:rPr>
-              <a:t>Hands-On</a:t>
-            </a:r>
-            <a:r>
-              <a:rPr lang="pt-PT" sz="3600" b="1" dirty="0">
-                <a:latin typeface="Calibri"/>
-                <a:ea typeface="Calibri"/>
-                <a:cs typeface="Calibri"/>
-              </a:rPr>
-              <a:t> – </a:t>
-            </a:r>
-            <a:r>
-              <a:rPr lang="pt-PT" sz="3600" b="1" dirty="0" err="1">
-                <a:latin typeface="Calibri"/>
-                <a:ea typeface="Calibri"/>
-                <a:cs typeface="Calibri"/>
-              </a:rPr>
-              <a:t>Part</a:t>
-            </a:r>
-            <a:r>
-              <a:rPr lang="pt-PT" sz="3600" b="1" dirty="0">
-                <a:latin typeface="Calibri"/>
-                <a:ea typeface="Calibri"/>
-                <a:cs typeface="Calibri"/>
-              </a:rPr>
-              <a:t> 2</a:t>
+              <a:t>Revisions</a:t>
             </a:r>
           </a:p>
         </p:txBody>
@@ -3958,7 +3909,7 @@
                 <a:latin typeface="Cambria"/>
                 <a:ea typeface="Cambria"/>
               </a:rPr>
-              <a:t>Exercises</a:t>
+              <a:t>Revisions</a:t>
             </a:r>
           </a:p>
         </p:txBody>
@@ -3992,186 +3943,62 @@
           <a:lstStyle/>
           <a:p>
             <a:r>
+              <a:rPr lang="pt-PT" sz="3000" dirty="0"/>
+              <a:t>Q&amp;A </a:t>
+            </a:r>
+            <a:r>
+              <a:rPr lang="pt-PT" sz="3000" dirty="0" err="1"/>
+              <a:t>about</a:t>
+            </a:r>
+            <a:r>
+              <a:rPr lang="pt-PT" sz="3000" dirty="0"/>
+              <a:t> </a:t>
+            </a:r>
+            <a:r>
+              <a:rPr lang="pt-PT" sz="3000" dirty="0" err="1"/>
+              <a:t>previous</a:t>
+            </a:r>
+            <a:r>
+              <a:rPr lang="pt-PT" sz="3000" dirty="0"/>
+              <a:t> </a:t>
+            </a:r>
+            <a:r>
+              <a:rPr lang="pt-PT" sz="3000" dirty="0" err="1"/>
+              <a:t>lessons</a:t>
+            </a:r>
+            <a:r>
+              <a:rPr lang="pt-PT" sz="3000" dirty="0"/>
+              <a:t>.</a:t>
+            </a:r>
+          </a:p>
+          <a:p>
+            <a:endParaRPr lang="pt-PT" sz="3000" dirty="0">
+              <a:ea typeface="+mn-lt"/>
+              <a:cs typeface="+mn-lt"/>
+            </a:endParaRPr>
+          </a:p>
+          <a:p>
+            <a:r>
+              <a:rPr lang="pt-PT" sz="3000" dirty="0">
+                <a:ea typeface="+mn-lt"/>
+                <a:cs typeface="+mn-lt"/>
+              </a:rPr>
+              <a:t>Exam </a:t>
+            </a:r>
+            <a:r>
               <a:rPr lang="pt-PT" sz="3000" dirty="0" err="1">
                 <a:ea typeface="+mn-lt"/>
                 <a:cs typeface="+mn-lt"/>
               </a:rPr>
-              <a:t>Let's</a:t>
+              <a:t>preparation</a:t>
             </a:r>
             <a:r>
               <a:rPr lang="pt-PT" sz="3000" dirty="0">
                 <a:ea typeface="+mn-lt"/>
                 <a:cs typeface="+mn-lt"/>
               </a:rPr>
-              <a:t> </a:t>
-            </a:r>
-            <a:r>
-              <a:rPr lang="pt-PT" sz="3000" dirty="0" err="1">
-                <a:ea typeface="+mn-lt"/>
-                <a:cs typeface="+mn-lt"/>
-              </a:rPr>
-              <a:t>implement</a:t>
-            </a:r>
-            <a:r>
-              <a:rPr lang="pt-PT" sz="3000" dirty="0">
-                <a:ea typeface="+mn-lt"/>
-                <a:cs typeface="+mn-lt"/>
-              </a:rPr>
-              <a:t> a </a:t>
-            </a:r>
-            <a:r>
-              <a:rPr lang="pt-PT" sz="3000" dirty="0" err="1">
-                <a:ea typeface="+mn-lt"/>
-                <a:cs typeface="+mn-lt"/>
-              </a:rPr>
-              <a:t>attention</a:t>
-            </a:r>
-            <a:r>
-              <a:rPr lang="pt-PT" sz="3000" dirty="0">
-                <a:ea typeface="+mn-lt"/>
-                <a:cs typeface="+mn-lt"/>
-              </a:rPr>
-              <a:t> </a:t>
-            </a:r>
-            <a:r>
-              <a:rPr lang="pt-PT" sz="3000" dirty="0" err="1">
-                <a:ea typeface="+mn-lt"/>
-                <a:cs typeface="+mn-lt"/>
-              </a:rPr>
-              <a:t>mechanisms</a:t>
-            </a:r>
-            <a:r>
-              <a:rPr lang="pt-PT" sz="3000" dirty="0">
-                <a:ea typeface="+mn-lt"/>
-                <a:cs typeface="+mn-lt"/>
-              </a:rPr>
-              <a:t> </a:t>
-            </a:r>
-            <a:r>
-              <a:rPr lang="pt-PT" sz="3000" dirty="0" err="1">
-                <a:ea typeface="+mn-lt"/>
-                <a:cs typeface="+mn-lt"/>
-              </a:rPr>
-              <a:t>with</a:t>
-            </a:r>
-            <a:r>
-              <a:rPr lang="pt-PT" sz="3000" dirty="0">
-                <a:ea typeface="+mn-lt"/>
-                <a:cs typeface="+mn-lt"/>
-              </a:rPr>
-              <a:t> </a:t>
-            </a:r>
-            <a:r>
-              <a:rPr lang="pt-PT" sz="3000" dirty="0" err="1">
-                <a:ea typeface="+mn-lt"/>
-                <a:cs typeface="+mn-lt"/>
-              </a:rPr>
-              <a:t>PyTorch</a:t>
-            </a:r>
-            <a:r>
-              <a:rPr lang="pt-PT" sz="3000" dirty="0">
-                <a:ea typeface="+mn-lt"/>
-                <a:cs typeface="+mn-lt"/>
-              </a:rPr>
-              <a:t>. </a:t>
-            </a:r>
-            <a:endParaRPr lang="pt-PT" sz="3000" dirty="0"/>
-          </a:p>
-          <a:p>
-            <a:endParaRPr lang="pt-PT"/>
-          </a:p>
-          <a:p>
-            <a:endParaRPr lang="pt-PT"/>
-          </a:p>
-          <a:p>
-            <a:endParaRPr lang="pt-PT"/>
-          </a:p>
-          <a:p>
-            <a:r>
-              <a:rPr lang="pt-PT" sz="3000" dirty="0" err="1">
-                <a:ea typeface="+mn-lt"/>
-                <a:cs typeface="+mn-lt"/>
-              </a:rPr>
-              <a:t>Follow</a:t>
-            </a:r>
-            <a:r>
-              <a:rPr lang="pt-PT" sz="3000" dirty="0">
-                <a:ea typeface="+mn-lt"/>
-                <a:cs typeface="+mn-lt"/>
-              </a:rPr>
-              <a:t> </a:t>
-            </a:r>
-            <a:r>
-              <a:rPr lang="pt-PT" sz="3000" dirty="0" err="1">
-                <a:ea typeface="+mn-lt"/>
-                <a:cs typeface="+mn-lt"/>
-              </a:rPr>
-              <a:t>the</a:t>
-            </a:r>
-            <a:r>
-              <a:rPr lang="pt-PT" sz="3000" dirty="0">
-                <a:ea typeface="+mn-lt"/>
-                <a:cs typeface="+mn-lt"/>
-              </a:rPr>
-              <a:t> </a:t>
-            </a:r>
-            <a:r>
-              <a:rPr lang="pt-PT" sz="3000" dirty="0" err="1">
-                <a:ea typeface="+mn-lt"/>
-                <a:cs typeface="+mn-lt"/>
-              </a:rPr>
-              <a:t>instructions</a:t>
-            </a:r>
-            <a:r>
-              <a:rPr lang="pt-PT" sz="3000" dirty="0">
-                <a:ea typeface="+mn-lt"/>
-                <a:cs typeface="+mn-lt"/>
-              </a:rPr>
-              <a:t> </a:t>
-            </a:r>
-            <a:r>
-              <a:rPr lang="pt-PT" sz="3000" dirty="0" err="1">
-                <a:ea typeface="+mn-lt"/>
-                <a:cs typeface="+mn-lt"/>
-              </a:rPr>
-              <a:t>on</a:t>
-            </a:r>
-            <a:r>
-              <a:rPr lang="pt-PT" sz="3000" dirty="0">
-                <a:ea typeface="+mn-lt"/>
-                <a:cs typeface="+mn-lt"/>
-              </a:rPr>
-              <a:t> </a:t>
-            </a:r>
-            <a:r>
-              <a:rPr lang="pt-PT" sz="3000" dirty="0" err="1">
-                <a:ea typeface="+mn-lt"/>
-                <a:cs typeface="+mn-lt"/>
-              </a:rPr>
-              <a:t>the</a:t>
-            </a:r>
-            <a:r>
-              <a:rPr lang="pt-PT" sz="3000" dirty="0">
-                <a:ea typeface="+mn-lt"/>
-                <a:cs typeface="+mn-lt"/>
-              </a:rPr>
-              <a:t> </a:t>
-            </a:r>
-            <a:r>
-              <a:rPr lang="pt-PT" sz="3000" dirty="0" err="1">
-                <a:ea typeface="+mn-lt"/>
-                <a:cs typeface="+mn-lt"/>
-              </a:rPr>
-              <a:t>notebook</a:t>
-            </a:r>
-            <a:r>
-              <a:rPr lang="pt-PT" sz="3000" dirty="0">
-                <a:ea typeface="+mn-lt"/>
-                <a:cs typeface="+mn-lt"/>
-              </a:rPr>
-              <a:t>: "seq2seq_translation_exercises.ipynb".</a:t>
-            </a:r>
-            <a:endParaRPr lang="pt-PT" dirty="0"/>
+              <a:t>.</a:t>
+            </a:r>
           </a:p>
           <a:p>
             <a:pPr algn="just"/>
@@ -4498,86 +4325,21 @@
           <a:lstStyle/>
           <a:p>
             <a:r>
+              <a:rPr lang="pt-PT" sz="900" dirty="0">
+                <a:solidFill>
+                  <a:srgbClr val="FFFFFF"/>
+                </a:solidFill>
+              </a:rPr>
+              <a:t>Exam </a:t>
+            </a:r>
+            <a:r>
               <a:rPr lang="pt-PT" sz="900" dirty="0" err="1">
                 <a:solidFill>
                   <a:srgbClr val="FFFFFF"/>
                 </a:solidFill>
-                <a:ea typeface="+mn-lt"/>
-                <a:cs typeface="+mn-lt"/>
               </a:rPr>
-              <a:t>Attention</a:t>
-            </a:r>
-            <a:r>
-              <a:rPr lang="pt-PT" sz="900" dirty="0">
-                <a:solidFill>
-                  <a:srgbClr val="FFFFFF"/>
-                </a:solidFill>
-                <a:ea typeface="+mn-lt"/>
-                <a:cs typeface="+mn-lt"/>
-              </a:rPr>
-              <a:t> </a:t>
-            </a:r>
-            <a:r>
-              <a:rPr lang="pt-PT" sz="900" dirty="0" err="1">
-                <a:solidFill>
-                  <a:srgbClr val="FFFFFF"/>
-                </a:solidFill>
-                <a:ea typeface="+mn-lt"/>
-                <a:cs typeface="+mn-lt"/>
-              </a:rPr>
-              <a:t>Mechanisms</a:t>
-            </a:r>
-            <a:r>
-              <a:rPr lang="pt-PT" sz="900" dirty="0">
-                <a:solidFill>
-                  <a:srgbClr val="FFFFFF"/>
-                </a:solidFill>
-                <a:ea typeface="+mn-lt"/>
-                <a:cs typeface="+mn-lt"/>
-              </a:rPr>
-              <a:t> – </a:t>
-            </a:r>
-            <a:r>
-              <a:rPr lang="pt-PT" sz="900" dirty="0" err="1">
-                <a:solidFill>
-                  <a:srgbClr val="FFFFFF"/>
-                </a:solidFill>
-                <a:ea typeface="+mn-lt"/>
-                <a:cs typeface="+mn-lt"/>
-              </a:rPr>
-              <a:t>Hands-On</a:t>
-            </a:r>
-            <a:r>
-              <a:rPr lang="pt-PT" sz="900" dirty="0">
-                <a:solidFill>
-                  <a:srgbClr val="FFFFFF"/>
-                </a:solidFill>
-                <a:ea typeface="+mn-lt"/>
-                <a:cs typeface="+mn-lt"/>
-              </a:rPr>
-              <a:t> – </a:t>
-            </a:r>
-            <a:r>
-              <a:rPr lang="pt-PT" sz="900" dirty="0" err="1">
-                <a:solidFill>
-                  <a:srgbClr val="FFFFFF"/>
-                </a:solidFill>
-                <a:ea typeface="+mn-lt"/>
-                <a:cs typeface="+mn-lt"/>
-              </a:rPr>
-              <a:t>Part</a:t>
-            </a:r>
-            <a:r>
-              <a:rPr lang="pt-PT" sz="900" dirty="0">
-                <a:solidFill>
-                  <a:srgbClr val="FFFFFF"/>
-                </a:solidFill>
-                <a:ea typeface="+mn-lt"/>
-                <a:cs typeface="+mn-lt"/>
-              </a:rPr>
-              <a:t> 2</a:t>
-            </a:r>
-            <a:endParaRPr lang="pt-PT" dirty="0" err="1"/>
+              <a:t>Revisions</a:t>
+            </a:r>
           </a:p>
         </p:txBody>
       </p:sp>

</xml_diff>